<commit_message>
Add new and Update ppts
- Update xds 130 and 世界之光.
- Add xds 81, 84, 85, 87, 88A, 88B, 92, 95, 99, 102, 105, 170.
- Add 耶穌你是寶貴.
</commit_message>
<xml_diff>
--- a/世界之光(崇拜版).pptx
+++ b/世界之光(崇拜版).pptx
@@ -7,10 +7,9 @@
   <p:sldIdLst>
     <p:sldId id="256" r:id="rId2"/>
     <p:sldId id="257" r:id="rId3"/>
-    <p:sldId id="258" r:id="rId4"/>
-    <p:sldId id="259" r:id="rId5"/>
+    <p:sldId id="259" r:id="rId4"/>
   </p:sldIdLst>
-  <p:sldSz cx="9144000" cy="6858000" type="screen4x3"/>
+  <p:sldSz cx="12192000" cy="6858000"/>
   <p:notesSz cx="6858000" cy="9144000"/>
   <p:defaultTextStyle>
     <a:defPPr>
@@ -107,6 +106,22 @@
       </a:defRPr>
     </a:lvl9pPr>
   </p:defaultTextStyle>
+  <p:extLst>
+    <p:ext uri="{EFAFB233-063F-42B5-8137-9DF3F51BA10A}">
+      <p15:sldGuideLst xmlns:p15="http://schemas.microsoft.com/office/powerpoint/2012/main">
+        <p15:guide id="1" orient="horz" pos="2160" userDrawn="1">
+          <p15:clr>
+            <a:srgbClr val="A4A3A4"/>
+          </p15:clr>
+        </p15:guide>
+        <p15:guide id="2" pos="3840" userDrawn="1">
+          <p15:clr>
+            <a:srgbClr val="A4A3A4"/>
+          </p15:clr>
+        </p15:guide>
+      </p15:sldGuideLst>
+    </p:ext>
+  </p:extLst>
 </p:presentation>
 </file>
 
@@ -139,8 +154,8 @@
         </p:nvSpPr>
         <p:spPr>
           <a:xfrm>
-            <a:off x="685800" y="2130425"/>
-            <a:ext cx="7772400" cy="1470025"/>
+            <a:off x="914400" y="2130426"/>
+            <a:ext cx="10363200" cy="1470025"/>
           </a:xfrm>
         </p:spPr>
         <p:txBody>
@@ -167,8 +182,8 @@
         </p:nvSpPr>
         <p:spPr>
           <a:xfrm>
-            <a:off x="1371600" y="3886200"/>
-            <a:ext cx="6400800" cy="1752600"/>
+            <a:off x="1828800" y="3886200"/>
+            <a:ext cx="8534400" cy="1752600"/>
           </a:xfrm>
         </p:spPr>
         <p:txBody>
@@ -291,7 +306,7 @@
           <a:p>
             <a:fld id="{FC85EC0F-5870-4DB9-BACB-D891ED0D09CE}" type="datetimeFigureOut">
               <a:rPr lang="zh-TW" altLang="en-US" smtClean="0"/>
-              <a:t>2018/2/25</a:t>
+              <a:t>2020/9/12</a:t>
             </a:fld>
             <a:endParaRPr lang="zh-TW" altLang="en-US"/>
           </a:p>
@@ -456,7 +471,7 @@
           <a:p>
             <a:fld id="{FC85EC0F-5870-4DB9-BACB-D891ED0D09CE}" type="datetimeFigureOut">
               <a:rPr lang="zh-TW" altLang="en-US" smtClean="0"/>
-              <a:t>2018/2/25</a:t>
+              <a:t>2020/9/12</a:t>
             </a:fld>
             <a:endParaRPr lang="zh-TW" altLang="en-US"/>
           </a:p>
@@ -541,8 +556,8 @@
         </p:nvSpPr>
         <p:spPr>
           <a:xfrm>
-            <a:off x="6629400" y="274638"/>
-            <a:ext cx="2057400" cy="5851525"/>
+            <a:off x="8839200" y="274639"/>
+            <a:ext cx="2743200" cy="5851525"/>
           </a:xfrm>
         </p:spPr>
         <p:txBody>
@@ -569,8 +584,8 @@
         </p:nvSpPr>
         <p:spPr>
           <a:xfrm>
-            <a:off x="457200" y="274638"/>
-            <a:ext cx="6019800" cy="5851525"/>
+            <a:off x="609600" y="274639"/>
+            <a:ext cx="8026400" cy="5851525"/>
           </a:xfrm>
         </p:spPr>
         <p:txBody>
@@ -631,7 +646,7 @@
           <a:p>
             <a:fld id="{FC85EC0F-5870-4DB9-BACB-D891ED0D09CE}" type="datetimeFigureOut">
               <a:rPr lang="zh-TW" altLang="en-US" smtClean="0"/>
-              <a:t>2018/2/25</a:t>
+              <a:t>2020/9/12</a:t>
             </a:fld>
             <a:endParaRPr lang="zh-TW" altLang="en-US"/>
           </a:p>
@@ -796,7 +811,7 @@
           <a:p>
             <a:fld id="{FC85EC0F-5870-4DB9-BACB-D891ED0D09CE}" type="datetimeFigureOut">
               <a:rPr lang="zh-TW" altLang="en-US" smtClean="0"/>
-              <a:t>2018/2/25</a:t>
+              <a:t>2020/9/12</a:t>
             </a:fld>
             <a:endParaRPr lang="zh-TW" altLang="en-US"/>
           </a:p>
@@ -881,8 +896,8 @@
         </p:nvSpPr>
         <p:spPr>
           <a:xfrm>
-            <a:off x="722313" y="4406900"/>
-            <a:ext cx="7772400" cy="1362075"/>
+            <a:off x="963084" y="4406901"/>
+            <a:ext cx="10363200" cy="1362075"/>
           </a:xfrm>
         </p:spPr>
         <p:txBody>
@@ -913,8 +928,8 @@
         </p:nvSpPr>
         <p:spPr>
           <a:xfrm>
-            <a:off x="722313" y="2906713"/>
-            <a:ext cx="7772400" cy="1500187"/>
+            <a:off x="963084" y="2906713"/>
+            <a:ext cx="10363200" cy="1500187"/>
           </a:xfrm>
         </p:spPr>
         <p:txBody>
@@ -1037,7 +1052,7 @@
           <a:p>
             <a:fld id="{FC85EC0F-5870-4DB9-BACB-D891ED0D09CE}" type="datetimeFigureOut">
               <a:rPr lang="zh-TW" altLang="en-US" smtClean="0"/>
-              <a:t>2018/2/25</a:t>
+              <a:t>2020/9/12</a:t>
             </a:fld>
             <a:endParaRPr lang="zh-TW" altLang="en-US"/>
           </a:p>
@@ -1145,8 +1160,8 @@
         </p:nvSpPr>
         <p:spPr>
           <a:xfrm>
-            <a:off x="457200" y="1600200"/>
-            <a:ext cx="4038600" cy="4525963"/>
+            <a:off x="609600" y="1600201"/>
+            <a:ext cx="5384800" cy="4525963"/>
           </a:xfrm>
         </p:spPr>
         <p:txBody>
@@ -1230,8 +1245,8 @@
         </p:nvSpPr>
         <p:spPr>
           <a:xfrm>
-            <a:off x="4648200" y="1600200"/>
-            <a:ext cx="4038600" cy="4525963"/>
+            <a:off x="6197600" y="1600201"/>
+            <a:ext cx="5384800" cy="4525963"/>
           </a:xfrm>
         </p:spPr>
         <p:txBody>
@@ -1320,7 +1335,7 @@
           <a:p>
             <a:fld id="{FC85EC0F-5870-4DB9-BACB-D891ED0D09CE}" type="datetimeFigureOut">
               <a:rPr lang="zh-TW" altLang="en-US" smtClean="0"/>
-              <a:t>2018/2/25</a:t>
+              <a:t>2020/9/12</a:t>
             </a:fld>
             <a:endParaRPr lang="zh-TW" altLang="en-US"/>
           </a:p>
@@ -1432,8 +1447,8 @@
         </p:nvSpPr>
         <p:spPr>
           <a:xfrm>
-            <a:off x="457200" y="1535113"/>
-            <a:ext cx="4040188" cy="639762"/>
+            <a:off x="609600" y="1535113"/>
+            <a:ext cx="5386917" cy="639762"/>
           </a:xfrm>
         </p:spPr>
         <p:txBody>
@@ -1497,8 +1512,8 @@
         </p:nvSpPr>
         <p:spPr>
           <a:xfrm>
-            <a:off x="457200" y="2174875"/>
-            <a:ext cx="4040188" cy="3951288"/>
+            <a:off x="609600" y="2174875"/>
+            <a:ext cx="5386917" cy="3951288"/>
           </a:xfrm>
         </p:spPr>
         <p:txBody>
@@ -1582,8 +1597,8 @@
         </p:nvSpPr>
         <p:spPr>
           <a:xfrm>
-            <a:off x="4645025" y="1535113"/>
-            <a:ext cx="4041775" cy="639762"/>
+            <a:off x="6193368" y="1535113"/>
+            <a:ext cx="5389033" cy="639762"/>
           </a:xfrm>
         </p:spPr>
         <p:txBody>
@@ -1647,8 +1662,8 @@
         </p:nvSpPr>
         <p:spPr>
           <a:xfrm>
-            <a:off x="4645025" y="2174875"/>
-            <a:ext cx="4041775" cy="3951288"/>
+            <a:off x="6193368" y="2174875"/>
+            <a:ext cx="5389033" cy="3951288"/>
           </a:xfrm>
         </p:spPr>
         <p:txBody>
@@ -1737,7 +1752,7 @@
           <a:p>
             <a:fld id="{FC85EC0F-5870-4DB9-BACB-D891ED0D09CE}" type="datetimeFigureOut">
               <a:rPr lang="zh-TW" altLang="en-US" smtClean="0"/>
-              <a:t>2018/2/25</a:t>
+              <a:t>2020/9/12</a:t>
             </a:fld>
             <a:endParaRPr lang="zh-TW" altLang="en-US"/>
           </a:p>
@@ -1850,7 +1865,7 @@
           <a:p>
             <a:fld id="{FC85EC0F-5870-4DB9-BACB-D891ED0D09CE}" type="datetimeFigureOut">
               <a:rPr lang="zh-TW" altLang="en-US" smtClean="0"/>
-              <a:t>2018/2/25</a:t>
+              <a:t>2020/9/12</a:t>
             </a:fld>
             <a:endParaRPr lang="zh-TW" altLang="en-US"/>
           </a:p>
@@ -1940,7 +1955,7 @@
           <a:p>
             <a:fld id="{FC85EC0F-5870-4DB9-BACB-D891ED0D09CE}" type="datetimeFigureOut">
               <a:rPr lang="zh-TW" altLang="en-US" smtClean="0"/>
-              <a:t>2018/2/25</a:t>
+              <a:t>2020/9/12</a:t>
             </a:fld>
             <a:endParaRPr lang="zh-TW" altLang="en-US"/>
           </a:p>
@@ -2025,8 +2040,8 @@
         </p:nvSpPr>
         <p:spPr>
           <a:xfrm>
-            <a:off x="457200" y="273050"/>
-            <a:ext cx="3008313" cy="1162050"/>
+            <a:off x="609601" y="273050"/>
+            <a:ext cx="4011084" cy="1162050"/>
           </a:xfrm>
         </p:spPr>
         <p:txBody>
@@ -2057,8 +2072,8 @@
         </p:nvSpPr>
         <p:spPr>
           <a:xfrm>
-            <a:off x="3575050" y="273050"/>
-            <a:ext cx="5111750" cy="5853113"/>
+            <a:off x="4766733" y="273051"/>
+            <a:ext cx="6815667" cy="5853113"/>
           </a:xfrm>
         </p:spPr>
         <p:txBody>
@@ -2142,8 +2157,8 @@
         </p:nvSpPr>
         <p:spPr>
           <a:xfrm>
-            <a:off x="457200" y="1435100"/>
-            <a:ext cx="3008313" cy="4691063"/>
+            <a:off x="609601" y="1435101"/>
+            <a:ext cx="4011084" cy="4691063"/>
           </a:xfrm>
         </p:spPr>
         <p:txBody>
@@ -2212,7 +2227,7 @@
           <a:p>
             <a:fld id="{FC85EC0F-5870-4DB9-BACB-D891ED0D09CE}" type="datetimeFigureOut">
               <a:rPr lang="zh-TW" altLang="en-US" smtClean="0"/>
-              <a:t>2018/2/25</a:t>
+              <a:t>2020/9/12</a:t>
             </a:fld>
             <a:endParaRPr lang="zh-TW" altLang="en-US"/>
           </a:p>
@@ -2297,8 +2312,8 @@
         </p:nvSpPr>
         <p:spPr>
           <a:xfrm>
-            <a:off x="1792288" y="4800600"/>
-            <a:ext cx="5486400" cy="566738"/>
+            <a:off x="2389717" y="4800600"/>
+            <a:ext cx="7315200" cy="566738"/>
           </a:xfrm>
         </p:spPr>
         <p:txBody>
@@ -2329,8 +2344,8 @@
         </p:nvSpPr>
         <p:spPr>
           <a:xfrm>
-            <a:off x="1792288" y="612775"/>
-            <a:ext cx="5486400" cy="4114800"/>
+            <a:off x="2389717" y="612775"/>
+            <a:ext cx="7315200" cy="4114800"/>
           </a:xfrm>
         </p:spPr>
         <p:txBody>
@@ -2394,8 +2409,8 @@
         </p:nvSpPr>
         <p:spPr>
           <a:xfrm>
-            <a:off x="1792288" y="5367338"/>
-            <a:ext cx="5486400" cy="804862"/>
+            <a:off x="2389717" y="5367338"/>
+            <a:ext cx="7315200" cy="804862"/>
           </a:xfrm>
         </p:spPr>
         <p:txBody>
@@ -2464,7 +2479,7 @@
           <a:p>
             <a:fld id="{FC85EC0F-5870-4DB9-BACB-D891ED0D09CE}" type="datetimeFigureOut">
               <a:rPr lang="zh-TW" altLang="en-US" smtClean="0"/>
-              <a:t>2018/2/25</a:t>
+              <a:t>2020/9/12</a:t>
             </a:fld>
             <a:endParaRPr lang="zh-TW" altLang="en-US"/>
           </a:p>
@@ -2559,8 +2574,8 @@
         </p:nvSpPr>
         <p:spPr>
           <a:xfrm>
-            <a:off x="457200" y="274638"/>
-            <a:ext cx="8229600" cy="1143000"/>
+            <a:off x="609600" y="274638"/>
+            <a:ext cx="10972800" cy="1143000"/>
           </a:xfrm>
           <a:prstGeom prst="rect">
             <a:avLst/>
@@ -2592,8 +2607,8 @@
         </p:nvSpPr>
         <p:spPr>
           <a:xfrm>
-            <a:off x="457200" y="1600200"/>
-            <a:ext cx="8229600" cy="4525963"/>
+            <a:off x="609600" y="1600201"/>
+            <a:ext cx="10972800" cy="4525963"/>
           </a:xfrm>
           <a:prstGeom prst="rect">
             <a:avLst/>
@@ -2654,8 +2669,8 @@
         </p:nvSpPr>
         <p:spPr>
           <a:xfrm>
-            <a:off x="457200" y="6356350"/>
-            <a:ext cx="2133600" cy="365125"/>
+            <a:off x="609600" y="6356351"/>
+            <a:ext cx="2844800" cy="365125"/>
           </a:xfrm>
           <a:prstGeom prst="rect">
             <a:avLst/>
@@ -2677,7 +2692,7 @@
           <a:p>
             <a:fld id="{FC85EC0F-5870-4DB9-BACB-D891ED0D09CE}" type="datetimeFigureOut">
               <a:rPr lang="zh-TW" altLang="en-US" smtClean="0"/>
-              <a:t>2018/2/25</a:t>
+              <a:t>2020/9/12</a:t>
             </a:fld>
             <a:endParaRPr lang="zh-TW" altLang="en-US"/>
           </a:p>
@@ -2695,8 +2710,8 @@
         </p:nvSpPr>
         <p:spPr>
           <a:xfrm>
-            <a:off x="3124200" y="6356350"/>
-            <a:ext cx="2895600" cy="365125"/>
+            <a:off x="4165600" y="6356351"/>
+            <a:ext cx="3860800" cy="365125"/>
           </a:xfrm>
           <a:prstGeom prst="rect">
             <a:avLst/>
@@ -2732,8 +2747,8 @@
         </p:nvSpPr>
         <p:spPr>
           <a:xfrm>
-            <a:off x="6553200" y="6356350"/>
-            <a:ext cx="2133600" cy="365125"/>
+            <a:off x="8737600" y="6356351"/>
+            <a:ext cx="2844800" cy="365125"/>
           </a:xfrm>
           <a:prstGeom prst="rect">
             <a:avLst/>
@@ -3059,11 +3074,13 @@
         </p:nvSpPr>
         <p:spPr/>
         <p:txBody>
-          <a:bodyPr/>
-          <a:lstStyle/>
-          <a:p>
-            <a:r>
-              <a:rPr lang="zh-CN" altLang="en-US" b="1" dirty="0" smtClean="0">
+          <a:bodyPr>
+            <a:normAutofit/>
+          </a:bodyPr>
+          <a:lstStyle/>
+          <a:p>
+            <a:r>
+              <a:rPr lang="zh-CN" altLang="en-US" sz="4800" b="1" dirty="0" smtClean="0">
                 <a:solidFill>
                   <a:srgbClr val="660033"/>
                 </a:solidFill>
@@ -3072,7 +3089,7 @@
               </a:rPr>
               <a:t>世界之光</a:t>
             </a:r>
-            <a:endParaRPr lang="zh-TW" altLang="en-US" b="1" dirty="0">
+            <a:endParaRPr lang="zh-TW" altLang="en-US" sz="4800" b="1" dirty="0">
               <a:solidFill>
                 <a:srgbClr val="660033"/>
               </a:solidFill>
@@ -3113,7 +3130,7 @@
               <a:t>耶穌世界的</a:t>
             </a:r>
             <a:r>
-              <a:rPr lang="zh-TW" altLang="en-US" sz="5400" b="1" dirty="0" smtClean="0">
+              <a:rPr lang="zh-TW" altLang="en-US" sz="5400" b="1" dirty="0">
                 <a:solidFill>
                   <a:srgbClr val="660033"/>
                 </a:solidFill>
@@ -3121,98 +3138,6 @@
                 <a:ea typeface="微軟正黑體" pitchFamily="34" charset="-120"/>
               </a:rPr>
               <a:t>盼望</a:t>
-            </a:r>
-            <a:endParaRPr lang="en-US" altLang="zh-TW" sz="5400" b="1" dirty="0" smtClean="0">
-              <a:solidFill>
-                <a:srgbClr val="660033"/>
-              </a:solidFill>
-              <a:latin typeface="微軟正黑體" pitchFamily="34" charset="-120"/>
-              <a:ea typeface="微軟正黑體" pitchFamily="34" charset="-120"/>
-            </a:endParaRPr>
-          </a:p>
-          <a:p>
-            <a:pPr algn="ctr">
-              <a:buNone/>
-            </a:pPr>
-            <a:r>
-              <a:rPr lang="zh-TW" altLang="en-US" sz="5400" b="1" dirty="0" smtClean="0">
-                <a:solidFill>
-                  <a:srgbClr val="660033"/>
-                </a:solidFill>
-                <a:latin typeface="微軟正黑體" pitchFamily="34" charset="-120"/>
-                <a:ea typeface="微軟正黑體" pitchFamily="34" charset="-120"/>
-              </a:rPr>
-              <a:t>唯一</a:t>
-            </a:r>
-            <a:r>
-              <a:rPr lang="zh-TW" altLang="en-US" sz="5400" b="1" dirty="0">
-                <a:solidFill>
-                  <a:srgbClr val="660033"/>
-                </a:solidFill>
-                <a:latin typeface="微軟正黑體" pitchFamily="34" charset="-120"/>
-                <a:ea typeface="微軟正黑體" pitchFamily="34" charset="-120"/>
-              </a:rPr>
-              <a:t>的真</a:t>
-            </a:r>
-            <a:r>
-              <a:rPr lang="zh-TW" altLang="en-US" sz="5400" b="1" dirty="0" smtClean="0">
-                <a:solidFill>
-                  <a:srgbClr val="660033"/>
-                </a:solidFill>
-                <a:latin typeface="微軟正黑體" pitchFamily="34" charset="-120"/>
-                <a:ea typeface="微軟正黑體" pitchFamily="34" charset="-120"/>
-              </a:rPr>
-              <a:t>光</a:t>
-            </a:r>
-            <a:r>
-              <a:rPr lang="en-US" altLang="zh-TW" sz="5400" b="1" dirty="0">
-                <a:solidFill>
-                  <a:srgbClr val="660033"/>
-                </a:solidFill>
-                <a:latin typeface="微軟正黑體" pitchFamily="34" charset="-120"/>
-                <a:ea typeface="微軟正黑體" pitchFamily="34" charset="-120"/>
-              </a:rPr>
-              <a:t> </a:t>
-            </a:r>
-            <a:r>
-              <a:rPr lang="en-US" altLang="zh-TW" sz="5400" b="1" dirty="0" smtClean="0">
-                <a:solidFill>
-                  <a:srgbClr val="660033"/>
-                </a:solidFill>
-                <a:latin typeface="微軟正黑體" pitchFamily="34" charset="-120"/>
-                <a:ea typeface="微軟正黑體" pitchFamily="34" charset="-120"/>
-              </a:rPr>
-              <a:t> </a:t>
-            </a:r>
-            <a:r>
-              <a:rPr lang="zh-TW" altLang="en-US" sz="5400" b="1" dirty="0" smtClean="0">
-                <a:solidFill>
-                  <a:srgbClr val="660033"/>
-                </a:solidFill>
-                <a:latin typeface="微軟正黑體" pitchFamily="34" charset="-120"/>
-                <a:ea typeface="微軟正黑體" pitchFamily="34" charset="-120"/>
-              </a:rPr>
-              <a:t>照亮</a:t>
-            </a:r>
-            <a:r>
-              <a:rPr lang="zh-TW" altLang="en-US" sz="5400" b="1" dirty="0">
-                <a:solidFill>
-                  <a:srgbClr val="660033"/>
-                </a:solidFill>
-                <a:latin typeface="微軟正黑體" pitchFamily="34" charset="-120"/>
-                <a:ea typeface="微軟正黑體" pitchFamily="34" charset="-120"/>
-              </a:rPr>
-              <a:t>一切</a:t>
-            </a:r>
-            <a:r>
-              <a:rPr lang="zh-TW" altLang="en-US" sz="5400" b="1" dirty="0" smtClean="0">
-                <a:solidFill>
-                  <a:srgbClr val="660033"/>
-                </a:solidFill>
-                <a:latin typeface="微軟正黑體" pitchFamily="34" charset="-120"/>
-                <a:ea typeface="微軟正黑體" pitchFamily="34" charset="-120"/>
-              </a:rPr>
-              <a:t>黑暗</a:t>
             </a:r>
             <a:endParaRPr lang="en-US" altLang="zh-TW" sz="5400" b="1" dirty="0">
               <a:solidFill>
@@ -3227,16 +3152,6 @@
               <a:buNone/>
             </a:pPr>
             <a:r>
-              <a:rPr lang="zh-TW" altLang="en-US" sz="5400" b="1" dirty="0" smtClean="0">
-                <a:solidFill>
-                  <a:srgbClr val="660033"/>
-                </a:solidFill>
-                <a:latin typeface="微軟正黑體" pitchFamily="34" charset="-120"/>
-                <a:ea typeface="微軟正黑體" pitchFamily="34" charset="-120"/>
-              </a:rPr>
-              <a:t>喔耶穌  道路</a:t>
-            </a:r>
-            <a:r>
               <a:rPr lang="zh-TW" altLang="en-US" sz="5400" b="1" dirty="0">
                 <a:solidFill>
                   <a:srgbClr val="660033"/>
@@ -3244,19 +3159,79 @@
                 <a:latin typeface="微軟正黑體" pitchFamily="34" charset="-120"/>
                 <a:ea typeface="微軟正黑體" pitchFamily="34" charset="-120"/>
               </a:rPr>
-              <a:t>真理和</a:t>
-            </a:r>
-            <a:r>
-              <a:rPr lang="zh-TW" altLang="en-US" sz="5400" b="1" dirty="0" smtClean="0">
-                <a:solidFill>
-                  <a:srgbClr val="660033"/>
-                </a:solidFill>
-                <a:latin typeface="微軟正黑體" pitchFamily="34" charset="-120"/>
-                <a:ea typeface="微軟正黑體" pitchFamily="34" charset="-120"/>
-              </a:rPr>
-              <a:t>生命</a:t>
-            </a:r>
-            <a:endParaRPr lang="en-US" altLang="zh-TW" sz="5400" b="1" dirty="0" smtClean="0">
+              <a:t>唯一</a:t>
+            </a:r>
+            <a:r>
+              <a:rPr lang="zh-TW" altLang="en-US" sz="5400" b="1" dirty="0">
+                <a:solidFill>
+                  <a:srgbClr val="660033"/>
+                </a:solidFill>
+                <a:latin typeface="微軟正黑體" pitchFamily="34" charset="-120"/>
+                <a:ea typeface="微軟正黑體" pitchFamily="34" charset="-120"/>
+              </a:rPr>
+              <a:t>的真</a:t>
+            </a:r>
+            <a:r>
+              <a:rPr lang="zh-TW" altLang="en-US" sz="5400" b="1" dirty="0">
+                <a:solidFill>
+                  <a:srgbClr val="660033"/>
+                </a:solidFill>
+                <a:latin typeface="微軟正黑體" pitchFamily="34" charset="-120"/>
+                <a:ea typeface="微軟正黑體" pitchFamily="34" charset="-120"/>
+              </a:rPr>
+              <a:t>光</a:t>
+            </a:r>
+            <a:r>
+              <a:rPr lang="en-US" altLang="zh-TW" sz="5400" b="1" dirty="0">
+                <a:solidFill>
+                  <a:srgbClr val="660033"/>
+                </a:solidFill>
+                <a:latin typeface="微軟正黑體" pitchFamily="34" charset="-120"/>
+                <a:ea typeface="微軟正黑體" pitchFamily="34" charset="-120"/>
+              </a:rPr>
+              <a:t> </a:t>
+            </a:r>
+            <a:r>
+              <a:rPr lang="en-US" altLang="zh-TW" sz="5400" b="1" dirty="0">
+                <a:solidFill>
+                  <a:srgbClr val="660033"/>
+                </a:solidFill>
+                <a:latin typeface="微軟正黑體" pitchFamily="34" charset="-120"/>
+                <a:ea typeface="微軟正黑體" pitchFamily="34" charset="-120"/>
+              </a:rPr>
+              <a:t> </a:t>
+            </a:r>
+            <a:r>
+              <a:rPr lang="zh-TW" altLang="en-US" sz="5400" b="1" dirty="0">
+                <a:solidFill>
+                  <a:srgbClr val="660033"/>
+                </a:solidFill>
+                <a:latin typeface="微軟正黑體" pitchFamily="34" charset="-120"/>
+                <a:ea typeface="微軟正黑體" pitchFamily="34" charset="-120"/>
+              </a:rPr>
+              <a:t>照亮</a:t>
+            </a:r>
+            <a:r>
+              <a:rPr lang="zh-TW" altLang="en-US" sz="5400" b="1" dirty="0">
+                <a:solidFill>
+                  <a:srgbClr val="660033"/>
+                </a:solidFill>
+                <a:latin typeface="微軟正黑體" pitchFamily="34" charset="-120"/>
+                <a:ea typeface="微軟正黑體" pitchFamily="34" charset="-120"/>
+              </a:rPr>
+              <a:t>一切</a:t>
+            </a:r>
+            <a:r>
+              <a:rPr lang="zh-TW" altLang="en-US" sz="5400" b="1" dirty="0">
+                <a:solidFill>
+                  <a:srgbClr val="660033"/>
+                </a:solidFill>
+                <a:latin typeface="微軟正黑體" pitchFamily="34" charset="-120"/>
+                <a:ea typeface="微軟正黑體" pitchFamily="34" charset="-120"/>
+              </a:rPr>
+              <a:t>黑暗</a:t>
+            </a:r>
+            <a:endParaRPr lang="en-US" altLang="zh-TW" sz="5400" b="1" dirty="0">
               <a:solidFill>
                 <a:srgbClr val="660033"/>
               </a:solidFill>
@@ -3269,7 +3244,49 @@
               <a:buNone/>
             </a:pPr>
             <a:r>
-              <a:rPr lang="zh-TW" altLang="en-US" sz="5400" b="1" dirty="0" smtClean="0">
+              <a:rPr lang="zh-TW" altLang="en-US" sz="5400" b="1" dirty="0">
+                <a:solidFill>
+                  <a:srgbClr val="660033"/>
+                </a:solidFill>
+                <a:latin typeface="微軟正黑體" pitchFamily="34" charset="-120"/>
+                <a:ea typeface="微軟正黑體" pitchFamily="34" charset="-120"/>
+              </a:rPr>
+              <a:t>喔耶穌  道路</a:t>
+            </a:r>
+            <a:r>
+              <a:rPr lang="zh-TW" altLang="en-US" sz="5400" b="1" dirty="0">
+                <a:solidFill>
+                  <a:srgbClr val="660033"/>
+                </a:solidFill>
+                <a:latin typeface="微軟正黑體" pitchFamily="34" charset="-120"/>
+                <a:ea typeface="微軟正黑體" pitchFamily="34" charset="-120"/>
+              </a:rPr>
+              <a:t>真理和</a:t>
+            </a:r>
+            <a:r>
+              <a:rPr lang="zh-TW" altLang="en-US" sz="5400" b="1" dirty="0">
+                <a:solidFill>
+                  <a:srgbClr val="660033"/>
+                </a:solidFill>
+                <a:latin typeface="微軟正黑體" pitchFamily="34" charset="-120"/>
+                <a:ea typeface="微軟正黑體" pitchFamily="34" charset="-120"/>
+              </a:rPr>
+              <a:t>生命</a:t>
+            </a:r>
+            <a:endParaRPr lang="en-US" altLang="zh-TW" sz="5400" b="1" dirty="0">
+              <a:solidFill>
+                <a:srgbClr val="660033"/>
+              </a:solidFill>
+              <a:latin typeface="微軟正黑體" pitchFamily="34" charset="-120"/>
+              <a:ea typeface="微軟正黑體" pitchFamily="34" charset="-120"/>
+            </a:endParaRPr>
+          </a:p>
+          <a:p>
+            <a:pPr algn="ctr">
+              <a:buNone/>
+            </a:pPr>
+            <a:r>
+              <a:rPr lang="zh-TW" altLang="en-US" sz="5400" b="1" dirty="0">
                 <a:solidFill>
                   <a:srgbClr val="660033"/>
                 </a:solidFill>
@@ -3289,7 +3306,7 @@
               <a:t>得至聖尊榮到</a:t>
             </a:r>
             <a:r>
-              <a:rPr lang="zh-TW" altLang="en-US" sz="5400" b="1" dirty="0" smtClean="0">
+              <a:rPr lang="zh-TW" altLang="en-US" sz="5400" b="1" dirty="0">
                 <a:solidFill>
                   <a:srgbClr val="660033"/>
                 </a:solidFill>
@@ -3345,11 +3362,13 @@
         </p:nvSpPr>
         <p:spPr/>
         <p:txBody>
-          <a:bodyPr/>
-          <a:lstStyle/>
-          <a:p>
-            <a:r>
-              <a:rPr lang="zh-CN" altLang="en-US" b="1" dirty="0" smtClean="0">
+          <a:bodyPr>
+            <a:normAutofit/>
+          </a:bodyPr>
+          <a:lstStyle/>
+          <a:p>
+            <a:r>
+              <a:rPr lang="zh-CN" altLang="en-US" sz="4800" b="1" dirty="0">
                 <a:solidFill>
                   <a:srgbClr val="660033"/>
                 </a:solidFill>
@@ -3358,7 +3377,7 @@
               </a:rPr>
               <a:t>世界之光</a:t>
             </a:r>
-            <a:endParaRPr lang="zh-TW" altLang="en-US" b="1" dirty="0">
+            <a:endParaRPr lang="zh-TW" altLang="en-US" sz="4800" b="1" dirty="0">
               <a:solidFill>
                 <a:srgbClr val="660033"/>
               </a:solidFill>
@@ -3389,6 +3408,16 @@
               <a:buNone/>
             </a:pPr>
             <a:r>
+              <a:rPr lang="zh-TW" altLang="en-US" sz="5400" b="1" dirty="0">
+                <a:solidFill>
+                  <a:srgbClr val="660033"/>
+                </a:solidFill>
+                <a:latin typeface="微軟正黑體" pitchFamily="34" charset="-120"/>
+                <a:ea typeface="微軟正黑體" pitchFamily="34" charset="-120"/>
+              </a:rPr>
+              <a:t>萬國萬民齊來敬</a:t>
+            </a:r>
+            <a:r>
               <a:rPr lang="zh-TW" altLang="en-US" sz="5400" b="1" dirty="0" smtClean="0">
                 <a:solidFill>
                   <a:srgbClr val="660033"/>
@@ -3396,7 +3425,69 @@
                 <a:latin typeface="微軟正黑體" pitchFamily="34" charset="-120"/>
                 <a:ea typeface="微軟正黑體" pitchFamily="34" charset="-120"/>
               </a:rPr>
-              <a:t>萬國萬民齊來敬拜</a:t>
+              <a:t>拜</a:t>
+            </a:r>
+            <a:r>
+              <a:rPr lang="en-US" altLang="zh-TW" sz="5400" b="1" dirty="0" smtClean="0">
+                <a:solidFill>
+                  <a:srgbClr val="660033"/>
+                </a:solidFill>
+                <a:latin typeface="微軟正黑體" pitchFamily="34" charset="-120"/>
+                <a:ea typeface="微軟正黑體" pitchFamily="34" charset="-120"/>
+              </a:rPr>
+              <a:t>  </a:t>
+            </a:r>
+            <a:r>
+              <a:rPr lang="zh-TW" altLang="en-US" sz="5400" b="1" dirty="0" smtClean="0">
+                <a:solidFill>
+                  <a:srgbClr val="660033"/>
+                </a:solidFill>
+                <a:latin typeface="微軟正黑體" pitchFamily="34" charset="-120"/>
+                <a:ea typeface="微軟正黑體" pitchFamily="34" charset="-120"/>
+              </a:rPr>
+              <a:t>在</a:t>
+            </a:r>
+            <a:r>
+              <a:rPr lang="zh-TW" altLang="en-US" sz="5400" b="1" dirty="0">
+                <a:solidFill>
+                  <a:srgbClr val="660033"/>
+                </a:solidFill>
+                <a:latin typeface="微軟正黑體" pitchFamily="34" charset="-120"/>
+                <a:ea typeface="微軟正黑體" pitchFamily="34" charset="-120"/>
+              </a:rPr>
+              <a:t>聖潔的光中</a:t>
+            </a:r>
+            <a:endParaRPr lang="en-US" altLang="zh-TW" sz="5400" b="1" dirty="0">
+              <a:solidFill>
+                <a:srgbClr val="660033"/>
+              </a:solidFill>
+              <a:latin typeface="微軟正黑體" pitchFamily="34" charset="-120"/>
+              <a:ea typeface="微軟正黑體" pitchFamily="34" charset="-120"/>
+            </a:endParaRPr>
+          </a:p>
+          <a:p>
+            <a:pPr algn="ctr">
+              <a:buNone/>
+            </a:pPr>
+            <a:r>
+              <a:rPr lang="zh-TW" altLang="en-US" sz="5400" b="1" dirty="0">
+                <a:solidFill>
+                  <a:srgbClr val="660033"/>
+                </a:solidFill>
+                <a:latin typeface="微軟正黑體" pitchFamily="34" charset="-120"/>
+                <a:ea typeface="微軟正黑體" pitchFamily="34" charset="-120"/>
+              </a:rPr>
+              <a:t>高舉耶穌基督的</a:t>
+            </a:r>
+            <a:r>
+              <a:rPr lang="zh-TW" altLang="en-US" sz="5400" b="1" dirty="0" smtClean="0">
+                <a:solidFill>
+                  <a:srgbClr val="660033"/>
+                </a:solidFill>
+                <a:latin typeface="微軟正黑體" pitchFamily="34" charset="-120"/>
+                <a:ea typeface="微軟正黑體" pitchFamily="34" charset="-120"/>
+              </a:rPr>
+              <a:t>名</a:t>
             </a:r>
             <a:endParaRPr lang="en-US" altLang="zh-TW" sz="5400" b="1" dirty="0" smtClean="0">
               <a:solidFill>
@@ -3411,16 +3502,16 @@
               <a:buNone/>
             </a:pPr>
             <a:r>
-              <a:rPr lang="zh-TW" altLang="en-US" sz="5400" b="1" dirty="0" smtClean="0">
-                <a:solidFill>
-                  <a:srgbClr val="660033"/>
-                </a:solidFill>
-                <a:latin typeface="微軟正黑體" pitchFamily="34" charset="-120"/>
-                <a:ea typeface="微軟正黑體" pitchFamily="34" charset="-120"/>
-              </a:rPr>
-              <a:t>在聖潔的光中</a:t>
-            </a:r>
-            <a:endParaRPr lang="en-US" altLang="zh-TW" sz="5400" b="1" dirty="0" smtClean="0">
+              <a:rPr lang="zh-TW" altLang="en-US" sz="5400" b="1" dirty="0">
+                <a:solidFill>
+                  <a:srgbClr val="660033"/>
+                </a:solidFill>
+                <a:latin typeface="微軟正黑體" pitchFamily="34" charset="-120"/>
+                <a:ea typeface="微軟正黑體" pitchFamily="34" charset="-120"/>
+              </a:rPr>
+              <a:t>天上地下齊來敬拜</a:t>
+            </a:r>
+            <a:endParaRPr lang="en-US" altLang="zh-TW" sz="5400" b="1" dirty="0">
               <a:solidFill>
                 <a:srgbClr val="660033"/>
               </a:solidFill>
@@ -3433,6 +3524,16 @@
               <a:buNone/>
             </a:pPr>
             <a:r>
+              <a:rPr lang="zh-TW" altLang="en-US" sz="5400" b="1" dirty="0">
+                <a:solidFill>
+                  <a:srgbClr val="660033"/>
+                </a:solidFill>
+                <a:latin typeface="微軟正黑體" pitchFamily="34" charset="-120"/>
+                <a:ea typeface="微軟正黑體" pitchFamily="34" charset="-120"/>
+              </a:rPr>
+              <a:t>願榮耀都</a:t>
+            </a:r>
+            <a:r>
               <a:rPr lang="zh-TW" altLang="en-US" sz="5400" b="1" dirty="0" smtClean="0">
                 <a:solidFill>
                   <a:srgbClr val="660033"/>
@@ -3440,8 +3541,142 @@
                 <a:latin typeface="微軟正黑體" pitchFamily="34" charset="-120"/>
                 <a:ea typeface="微軟正黑體" pitchFamily="34" charset="-120"/>
               </a:rPr>
-              <a:t>高舉耶穌基督的名</a:t>
-            </a:r>
+              <a:t>歸</a:t>
+            </a:r>
+            <a:r>
+              <a:rPr lang="zh-CN" altLang="en-US" sz="5400" b="1" dirty="0">
+                <a:solidFill>
+                  <a:srgbClr val="660033"/>
+                </a:solidFill>
+                <a:latin typeface="微軟正黑體" pitchFamily="34" charset="-120"/>
+                <a:ea typeface="微軟正黑體" pitchFamily="34" charset="-120"/>
+              </a:rPr>
+              <a:t>袮</a:t>
+            </a:r>
+            <a:r>
+              <a:rPr lang="en-US" altLang="zh-TW" sz="5400" b="1" dirty="0" smtClean="0">
+                <a:solidFill>
+                  <a:srgbClr val="660033"/>
+                </a:solidFill>
+                <a:latin typeface="微軟正黑體" pitchFamily="34" charset="-120"/>
+                <a:ea typeface="微軟正黑體" pitchFamily="34" charset="-120"/>
+              </a:rPr>
+              <a:t>  </a:t>
+            </a:r>
+            <a:r>
+              <a:rPr lang="zh-TW" altLang="en-US" sz="5400" b="1" dirty="0" smtClean="0">
+                <a:solidFill>
+                  <a:srgbClr val="660033"/>
+                </a:solidFill>
+                <a:latin typeface="微軟正黑體" pitchFamily="34" charset="-120"/>
+                <a:ea typeface="微軟正黑體" pitchFamily="34" charset="-120"/>
+              </a:rPr>
+              <a:t>願</a:t>
+            </a:r>
+            <a:r>
+              <a:rPr lang="zh-TW" altLang="en-US" sz="5400" b="1" dirty="0">
+                <a:solidFill>
+                  <a:srgbClr val="660033"/>
+                </a:solidFill>
+                <a:latin typeface="微軟正黑體" pitchFamily="34" charset="-120"/>
+                <a:ea typeface="微軟正黑體" pitchFamily="34" charset="-120"/>
+              </a:rPr>
+              <a:t>榮耀都</a:t>
+            </a:r>
+            <a:r>
+              <a:rPr lang="zh-TW" altLang="en-US" sz="5400" b="1" dirty="0" smtClean="0">
+                <a:solidFill>
+                  <a:srgbClr val="660033"/>
+                </a:solidFill>
+                <a:latin typeface="微軟正黑體" pitchFamily="34" charset="-120"/>
+                <a:ea typeface="微軟正黑體" pitchFamily="34" charset="-120"/>
+              </a:rPr>
+              <a:t>歸</a:t>
+            </a:r>
+            <a:r>
+              <a:rPr lang="zh-CN" altLang="en-US" sz="5400" b="1" dirty="0">
+                <a:solidFill>
+                  <a:srgbClr val="660033"/>
+                </a:solidFill>
+                <a:latin typeface="微軟正黑體" pitchFamily="34" charset="-120"/>
+                <a:ea typeface="微軟正黑體" pitchFamily="34" charset="-120"/>
+              </a:rPr>
+              <a:t>袮</a:t>
+            </a:r>
+            <a:endParaRPr lang="en-US" altLang="zh-TW" sz="5400" b="1" dirty="0">
+              <a:solidFill>
+                <a:srgbClr val="660033"/>
+              </a:solidFill>
+              <a:latin typeface="微軟正黑體" pitchFamily="34" charset="-120"/>
+              <a:ea typeface="微軟正黑體" pitchFamily="34" charset="-120"/>
+            </a:endParaRPr>
+          </a:p>
+          <a:p>
+            <a:pPr algn="ctr">
+              <a:buNone/>
+            </a:pPr>
+            <a:r>
+              <a:rPr lang="zh-TW" altLang="en-US" sz="5400" b="1" dirty="0">
+                <a:solidFill>
+                  <a:srgbClr val="660033"/>
+                </a:solidFill>
+                <a:latin typeface="微軟正黑體" pitchFamily="34" charset="-120"/>
+                <a:ea typeface="微軟正黑體" pitchFamily="34" charset="-120"/>
+              </a:rPr>
+              <a:t>願榮耀都</a:t>
+            </a:r>
+            <a:r>
+              <a:rPr lang="zh-TW" altLang="en-US" sz="5400" b="1" dirty="0" smtClean="0">
+                <a:solidFill>
+                  <a:srgbClr val="660033"/>
+                </a:solidFill>
+                <a:latin typeface="微軟正黑體" pitchFamily="34" charset="-120"/>
+                <a:ea typeface="微軟正黑體" pitchFamily="34" charset="-120"/>
+              </a:rPr>
+              <a:t>歸</a:t>
+            </a:r>
+            <a:r>
+              <a:rPr lang="zh-CN" altLang="en-US" sz="5400" b="1" dirty="0" smtClean="0">
+                <a:solidFill>
+                  <a:srgbClr val="660033"/>
+                </a:solidFill>
+                <a:latin typeface="微軟正黑體" pitchFamily="34" charset="-120"/>
+                <a:ea typeface="微軟正黑體" pitchFamily="34" charset="-120"/>
+              </a:rPr>
+              <a:t>袮  </a:t>
+            </a:r>
+            <a:r>
+              <a:rPr lang="zh-TW" altLang="en-US" sz="5400" b="1" dirty="0" smtClean="0">
+                <a:solidFill>
+                  <a:srgbClr val="660033"/>
+                </a:solidFill>
+                <a:latin typeface="微軟正黑體" pitchFamily="34" charset="-120"/>
+                <a:ea typeface="微軟正黑體" pitchFamily="34" charset="-120"/>
+              </a:rPr>
+              <a:t>世</a:t>
+            </a:r>
+            <a:r>
+              <a:rPr lang="zh-TW" altLang="en-US" sz="5400" b="1" dirty="0">
+                <a:solidFill>
+                  <a:srgbClr val="660033"/>
+                </a:solidFill>
+                <a:latin typeface="微軟正黑體" pitchFamily="34" charset="-120"/>
+                <a:ea typeface="微軟正黑體" pitchFamily="34" charset="-120"/>
+              </a:rPr>
+              <a:t>界之光</a:t>
+            </a:r>
+          </a:p>
+          <a:p>
+            <a:pPr algn="ctr">
+              <a:buNone/>
+            </a:pPr>
+            <a:endParaRPr lang="zh-TW" altLang="en-US" sz="5400" b="1" dirty="0">
+              <a:solidFill>
+                <a:srgbClr val="660033"/>
+              </a:solidFill>
+              <a:latin typeface="微軟正黑體" pitchFamily="34" charset="-120"/>
+              <a:ea typeface="微軟正黑體" pitchFamily="34" charset="-120"/>
+            </a:endParaRPr>
           </a:p>
         </p:txBody>
       </p:sp>
@@ -3526,16 +3761,16 @@
               <a:buNone/>
             </a:pPr>
             <a:r>
-              <a:rPr lang="zh-TW" altLang="en-US" sz="5400" b="1" dirty="0" smtClean="0">
-                <a:solidFill>
-                  <a:srgbClr val="660033"/>
-                </a:solidFill>
-                <a:latin typeface="微軟正黑體" pitchFamily="34" charset="-120"/>
-                <a:ea typeface="微軟正黑體" pitchFamily="34" charset="-120"/>
-              </a:rPr>
-              <a:t>天上地下齊來敬拜</a:t>
-            </a:r>
-            <a:endParaRPr lang="en-US" altLang="zh-TW" sz="5400" b="1" dirty="0" smtClean="0">
+              <a:rPr lang="zh-TW" altLang="en-US" sz="5400" b="1" dirty="0">
+                <a:solidFill>
+                  <a:srgbClr val="660033"/>
+                </a:solidFill>
+                <a:latin typeface="微軟正黑體" pitchFamily="34" charset="-120"/>
+                <a:ea typeface="微軟正黑體" pitchFamily="34" charset="-120"/>
+              </a:rPr>
+              <a:t>哈利路亞  哈利路亞</a:t>
+            </a:r>
+            <a:endParaRPr lang="en-US" altLang="zh-TW" sz="5400" b="1" dirty="0">
               <a:solidFill>
                 <a:srgbClr val="660033"/>
               </a:solidFill>
@@ -3548,166 +3783,7 @@
               <a:buNone/>
             </a:pPr>
             <a:r>
-              <a:rPr lang="zh-TW" altLang="en-US" sz="5400" b="1" dirty="0" smtClean="0">
-                <a:solidFill>
-                  <a:srgbClr val="660033"/>
-                </a:solidFill>
-                <a:latin typeface="微軟正黑體" pitchFamily="34" charset="-120"/>
-                <a:ea typeface="微軟正黑體" pitchFamily="34" charset="-120"/>
-              </a:rPr>
-              <a:t>願榮耀都歸你</a:t>
-            </a:r>
-            <a:endParaRPr lang="en-US" altLang="zh-TW" sz="5400" b="1" dirty="0" smtClean="0">
-              <a:solidFill>
-                <a:srgbClr val="660033"/>
-              </a:solidFill>
-              <a:latin typeface="微軟正黑體" pitchFamily="34" charset="-120"/>
-              <a:ea typeface="微軟正黑體" pitchFamily="34" charset="-120"/>
-            </a:endParaRPr>
-          </a:p>
-          <a:p>
-            <a:pPr algn="ctr">
-              <a:buNone/>
-            </a:pPr>
-            <a:r>
-              <a:rPr lang="zh-TW" altLang="en-US" sz="5400" b="1" dirty="0" smtClean="0">
-                <a:solidFill>
-                  <a:srgbClr val="660033"/>
-                </a:solidFill>
-                <a:latin typeface="微軟正黑體" pitchFamily="34" charset="-120"/>
-                <a:ea typeface="微軟正黑體" pitchFamily="34" charset="-120"/>
-              </a:rPr>
-              <a:t>願榮耀都歸你</a:t>
-            </a:r>
-            <a:endParaRPr lang="en-US" altLang="zh-TW" sz="5400" b="1" dirty="0" smtClean="0">
-              <a:solidFill>
-                <a:srgbClr val="660033"/>
-              </a:solidFill>
-              <a:latin typeface="微軟正黑體" pitchFamily="34" charset="-120"/>
-              <a:ea typeface="微軟正黑體" pitchFamily="34" charset="-120"/>
-            </a:endParaRPr>
-          </a:p>
-          <a:p>
-            <a:pPr algn="ctr">
-              <a:buNone/>
-            </a:pPr>
-            <a:r>
-              <a:rPr lang="zh-TW" altLang="en-US" sz="5400" b="1" dirty="0" smtClean="0">
-                <a:solidFill>
-                  <a:srgbClr val="660033"/>
-                </a:solidFill>
-                <a:latin typeface="微軟正黑體" pitchFamily="34" charset="-120"/>
-                <a:ea typeface="微軟正黑體" pitchFamily="34" charset="-120"/>
-              </a:rPr>
-              <a:t>願榮耀都歸你  世界之光</a:t>
-            </a:r>
-          </a:p>
-        </p:txBody>
-      </p:sp>
-    </p:spTree>
-  </p:cSld>
-  <p:clrMapOvr>
-    <a:masterClrMapping/>
-  </p:clrMapOvr>
-</p:sld>
-</file>
-
-<file path=ppt/slides/slide4.xml><?xml version="1.0" encoding="utf-8"?>
-<p:sld xmlns:a="http://schemas.openxmlformats.org/drawingml/2006/main" xmlns:r="http://schemas.openxmlformats.org/officeDocument/2006/relationships" xmlns:p="http://schemas.openxmlformats.org/presentationml/2006/main">
-  <p:cSld>
-    <p:spTree>
-      <p:nvGrpSpPr>
-        <p:cNvPr id="1" name=""/>
-        <p:cNvGrpSpPr/>
-        <p:nvPr/>
-      </p:nvGrpSpPr>
-      <p:grpSpPr>
-        <a:xfrm>
-          <a:off x="0" y="0"/>
-          <a:ext cx="0" cy="0"/>
-          <a:chOff x="0" y="0"/>
-          <a:chExt cx="0" cy="0"/>
-        </a:xfrm>
-      </p:grpSpPr>
-      <p:sp>
-        <p:nvSpPr>
-          <p:cNvPr id="4" name="標題 3"/>
-          <p:cNvSpPr>
-            <a:spLocks noGrp="1"/>
-          </p:cNvSpPr>
-          <p:nvPr>
-            <p:ph type="title"/>
-          </p:nvPr>
-        </p:nvSpPr>
-        <p:spPr/>
-        <p:txBody>
-          <a:bodyPr/>
-          <a:lstStyle/>
-          <a:p>
-            <a:r>
-              <a:rPr lang="zh-CN" altLang="en-US" b="1" dirty="0" smtClean="0">
-                <a:solidFill>
-                  <a:srgbClr val="660033"/>
-                </a:solidFill>
-                <a:latin typeface="微軟正黑體" pitchFamily="34" charset="-120"/>
-                <a:ea typeface="微軟正黑體" pitchFamily="34" charset="-120"/>
-              </a:rPr>
-              <a:t>世界之光</a:t>
-            </a:r>
-            <a:endParaRPr lang="zh-TW" altLang="en-US" b="1" dirty="0">
-              <a:solidFill>
-                <a:srgbClr val="660033"/>
-              </a:solidFill>
-              <a:latin typeface="微軟正黑體" pitchFamily="34" charset="-120"/>
-              <a:ea typeface="微軟正黑體" pitchFamily="34" charset="-120"/>
-            </a:endParaRPr>
-          </a:p>
-        </p:txBody>
-      </p:sp>
-      <p:sp>
-        <p:nvSpPr>
-          <p:cNvPr id="5" name="內容版面配置區 4"/>
-          <p:cNvSpPr>
-            <a:spLocks noGrp="1"/>
-          </p:cNvSpPr>
-          <p:nvPr>
-            <p:ph idx="1"/>
-          </p:nvPr>
-        </p:nvSpPr>
-        <p:spPr/>
-        <p:txBody>
-          <a:bodyPr>
-            <a:noAutofit/>
-          </a:bodyPr>
-          <a:lstStyle/>
-          <a:p>
-            <a:pPr algn="ctr">
-              <a:buNone/>
-            </a:pPr>
-            <a:r>
-              <a:rPr lang="zh-TW" altLang="en-US" sz="5400" b="1" dirty="0" smtClean="0">
-                <a:solidFill>
-                  <a:srgbClr val="660033"/>
-                </a:solidFill>
-                <a:latin typeface="微軟正黑體" pitchFamily="34" charset="-120"/>
-                <a:ea typeface="微軟正黑體" pitchFamily="34" charset="-120"/>
-              </a:rPr>
-              <a:t>哈利路亞  哈利路亞</a:t>
-            </a:r>
-            <a:endParaRPr lang="en-US" altLang="zh-TW" sz="5400" b="1" dirty="0" smtClean="0">
-              <a:solidFill>
-                <a:srgbClr val="660033"/>
-              </a:solidFill>
-              <a:latin typeface="微軟正黑體" pitchFamily="34" charset="-120"/>
-              <a:ea typeface="微軟正黑體" pitchFamily="34" charset="-120"/>
-            </a:endParaRPr>
-          </a:p>
-          <a:p>
-            <a:pPr algn="ctr">
-              <a:buNone/>
-            </a:pPr>
-            <a:r>
-              <a:rPr lang="zh-TW" altLang="en-US" sz="5400" b="1" dirty="0" smtClean="0">
+              <a:rPr lang="zh-TW" altLang="en-US" sz="5400" b="1" dirty="0">
                 <a:solidFill>
                   <a:srgbClr val="660033"/>
                 </a:solidFill>

</xml_diff>